<commit_message>
update with feedback from exercice 19
</commit_message>
<xml_diff>
--- a/PythonParLaPratique 101 exercices/Python in 90 minutes [Enregistrement automatique].pptx
+++ b/PythonParLaPratique 101 exercices/Python in 90 minutes [Enregistrement automatique].pptx
@@ -5,7 +5,7 @@
     <p:sldMasterId id="2147483648" r:id="rId1"/>
   </p:sldMasterIdLst>
   <p:notesMasterIdLst>
-    <p:notesMasterId r:id="rId66"/>
+    <p:notesMasterId r:id="rId68"/>
   </p:notesMasterIdLst>
   <p:sldIdLst>
     <p:sldId id="312" r:id="rId2"/>
@@ -71,7 +71,9 @@
     <p:sldId id="322" r:id="rId62"/>
     <p:sldId id="323" r:id="rId63"/>
     <p:sldId id="324" r:id="rId64"/>
-    <p:sldId id="313" r:id="rId65"/>
+    <p:sldId id="325" r:id="rId65"/>
+    <p:sldId id="326" r:id="rId66"/>
+    <p:sldId id="313" r:id="rId67"/>
   </p:sldIdLst>
   <p:sldSz cx="9144000" cy="5143500" type="screen16x9"/>
   <p:notesSz cx="6858000" cy="9144000"/>
@@ -271,7 +273,7 @@
           <a:p>
             <a:fld id="{829F1E88-4488-4CE8-BDBF-59CF83C504B4}" type="datetimeFigureOut">
               <a:rPr lang="en-US" smtClean="0"/>
-              <a:t>2/6/2020</a:t>
+              <a:t>2/12/2020</a:t>
             </a:fld>
             <a:endParaRPr lang="en-US" dirty="0"/>
           </a:p>
@@ -4702,7 +4704,7 @@
           <a:p>
             <a:fld id="{161584AF-7AC8-40C7-953D-3450698B316C}" type="slidenum">
               <a:rPr lang="en-US" smtClean="0"/>
-              <a:t>64</a:t>
+              <a:t>66</a:t>
             </a:fld>
             <a:endParaRPr lang="en-US" dirty="0"/>
           </a:p>
@@ -5252,7 +5254,7 @@
           <a:p>
             <a:fld id="{36362479-C79C-4ADE-9DE0-CA57D0B45DD3}" type="datetimeFigureOut">
               <a:rPr lang="en-US" smtClean="0"/>
-              <a:t>2/6/2020</a:t>
+              <a:t>2/12/2020</a:t>
             </a:fld>
             <a:endParaRPr lang="en-US" dirty="0"/>
           </a:p>
@@ -5420,7 +5422,7 @@
           <a:p>
             <a:fld id="{36362479-C79C-4ADE-9DE0-CA57D0B45DD3}" type="datetimeFigureOut">
               <a:rPr lang="en-US" smtClean="0"/>
-              <a:t>2/6/2020</a:t>
+              <a:t>2/12/2020</a:t>
             </a:fld>
             <a:endParaRPr lang="en-US" dirty="0"/>
           </a:p>
@@ -5598,7 +5600,7 @@
           <a:p>
             <a:fld id="{36362479-C79C-4ADE-9DE0-CA57D0B45DD3}" type="datetimeFigureOut">
               <a:rPr lang="en-US" smtClean="0"/>
-              <a:t>2/6/2020</a:t>
+              <a:t>2/12/2020</a:t>
             </a:fld>
             <a:endParaRPr lang="en-US" dirty="0"/>
           </a:p>
@@ -5766,7 +5768,7 @@
           <a:p>
             <a:fld id="{36362479-C79C-4ADE-9DE0-CA57D0B45DD3}" type="datetimeFigureOut">
               <a:rPr lang="en-US" smtClean="0"/>
-              <a:t>2/6/2020</a:t>
+              <a:t>2/12/2020</a:t>
             </a:fld>
             <a:endParaRPr lang="en-US" dirty="0"/>
           </a:p>
@@ -6011,7 +6013,7 @@
           <a:p>
             <a:fld id="{36362479-C79C-4ADE-9DE0-CA57D0B45DD3}" type="datetimeFigureOut">
               <a:rPr lang="en-US" smtClean="0"/>
-              <a:t>2/6/2020</a:t>
+              <a:t>2/12/2020</a:t>
             </a:fld>
             <a:endParaRPr lang="en-US" dirty="0"/>
           </a:p>
@@ -6296,7 +6298,7 @@
           <a:p>
             <a:fld id="{36362479-C79C-4ADE-9DE0-CA57D0B45DD3}" type="datetimeFigureOut">
               <a:rPr lang="en-US" smtClean="0"/>
-              <a:t>2/6/2020</a:t>
+              <a:t>2/12/2020</a:t>
             </a:fld>
             <a:endParaRPr lang="en-US" dirty="0"/>
           </a:p>
@@ -6720,7 +6722,7 @@
           <a:p>
             <a:fld id="{36362479-C79C-4ADE-9DE0-CA57D0B45DD3}" type="datetimeFigureOut">
               <a:rPr lang="en-US" smtClean="0"/>
-              <a:t>2/6/2020</a:t>
+              <a:t>2/12/2020</a:t>
             </a:fld>
             <a:endParaRPr lang="en-US" dirty="0"/>
           </a:p>
@@ -6837,7 +6839,7 @@
           <a:p>
             <a:fld id="{36362479-C79C-4ADE-9DE0-CA57D0B45DD3}" type="datetimeFigureOut">
               <a:rPr lang="en-US" smtClean="0"/>
-              <a:t>2/6/2020</a:t>
+              <a:t>2/12/2020</a:t>
             </a:fld>
             <a:endParaRPr lang="en-US" dirty="0"/>
           </a:p>
@@ -6932,7 +6934,7 @@
           <a:p>
             <a:fld id="{36362479-C79C-4ADE-9DE0-CA57D0B45DD3}" type="datetimeFigureOut">
               <a:rPr lang="en-US" smtClean="0"/>
-              <a:t>2/6/2020</a:t>
+              <a:t>2/12/2020</a:t>
             </a:fld>
             <a:endParaRPr lang="en-US" dirty="0"/>
           </a:p>
@@ -7207,7 +7209,7 @@
           <a:p>
             <a:fld id="{36362479-C79C-4ADE-9DE0-CA57D0B45DD3}" type="datetimeFigureOut">
               <a:rPr lang="en-US" smtClean="0"/>
-              <a:t>2/6/2020</a:t>
+              <a:t>2/12/2020</a:t>
             </a:fld>
             <a:endParaRPr lang="en-US" dirty="0"/>
           </a:p>
@@ -7459,7 +7461,7 @@
           <a:p>
             <a:fld id="{36362479-C79C-4ADE-9DE0-CA57D0B45DD3}" type="datetimeFigureOut">
               <a:rPr lang="en-US" smtClean="0"/>
-              <a:t>2/6/2020</a:t>
+              <a:t>2/12/2020</a:t>
             </a:fld>
             <a:endParaRPr lang="en-US" dirty="0"/>
           </a:p>
@@ -7670,7 +7672,7 @@
           <a:p>
             <a:fld id="{36362479-C79C-4ADE-9DE0-CA57D0B45DD3}" type="datetimeFigureOut">
               <a:rPr lang="en-US" smtClean="0"/>
-              <a:t>2/6/2020</a:t>
+              <a:t>2/12/2020</a:t>
             </a:fld>
             <a:endParaRPr lang="en-US" dirty="0"/>
           </a:p>
@@ -46455,6 +46457,1867 @@
           <a:chExt cx="0" cy="0"/>
         </a:xfrm>
       </p:grpSpPr>
+      <p:sp>
+        <p:nvSpPr>
+          <p:cNvPr id="2" name="Titre 1">
+            <a:extLst>
+              <a:ext uri="{FF2B5EF4-FFF2-40B4-BE49-F238E27FC236}">
+                <a16:creationId xmlns:a16="http://schemas.microsoft.com/office/drawing/2014/main" id="{70D9D609-A496-4FFE-B73D-F2D08047646C}"/>
+              </a:ext>
+            </a:extLst>
+          </p:cNvPr>
+          <p:cNvSpPr>
+            <a:spLocks noGrp="1"/>
+          </p:cNvSpPr>
+          <p:nvPr>
+            <p:ph type="title"/>
+          </p:nvPr>
+        </p:nvSpPr>
+        <p:spPr/>
+        <p:txBody>
+          <a:bodyPr>
+            <a:normAutofit fontScale="90000"/>
+          </a:bodyPr>
+          <a:lstStyle/>
+          <a:p>
+            <a:r>
+              <a:rPr lang="fr-FR" altLang="fr-FR" sz="4000" dirty="0">
+                <a:latin typeface="Arial" panose="020B0604020202020204" pitchFamily="34" charset="0"/>
+              </a:rPr>
+              <a:t>Récupérer un élément dans une liste</a:t>
+            </a:r>
+            <a:br>
+              <a:rPr lang="fr-FR" altLang="fr-FR" dirty="0">
+                <a:latin typeface="Arial" panose="020B0604020202020204" pitchFamily="34" charset="0"/>
+              </a:rPr>
+            </a:br>
+            <a:endParaRPr lang="fr-FR" dirty="0"/>
+          </a:p>
+        </p:txBody>
+      </p:sp>
+      <p:sp>
+        <p:nvSpPr>
+          <p:cNvPr id="4" name="Rectangle 1">
+            <a:extLst>
+              <a:ext uri="{FF2B5EF4-FFF2-40B4-BE49-F238E27FC236}">
+                <a16:creationId xmlns:a16="http://schemas.microsoft.com/office/drawing/2014/main" id="{4D6EAB4D-389F-4C2B-A878-FBB8FFE2F5F1}"/>
+              </a:ext>
+            </a:extLst>
+          </p:cNvPr>
+          <p:cNvSpPr>
+            <a:spLocks noGrp="1" noChangeArrowheads="1"/>
+          </p:cNvSpPr>
+          <p:nvPr>
+            <p:ph idx="1"/>
+          </p:nvPr>
+        </p:nvSpPr>
+        <p:spPr bwMode="auto">
+          <a:xfrm>
+            <a:off x="457200" y="1327727"/>
+            <a:ext cx="8703024" cy="3139321"/>
+          </a:xfrm>
+          <a:prstGeom prst="rect">
+            <a:avLst/>
+          </a:prstGeom>
+          <a:noFill/>
+          <a:ln>
+            <a:noFill/>
+          </a:ln>
+          <a:effectLst/>
+          <a:extLst>
+            <a:ext uri="{909E8E84-426E-40DD-AFC4-6F175D3DCCD1}">
+              <a14:hiddenFill xmlns:a14="http://schemas.microsoft.com/office/drawing/2010/main">
+                <a:solidFill>
+                  <a:schemeClr val="accent1"/>
+                </a:solidFill>
+              </a14:hiddenFill>
+            </a:ext>
+            <a:ext uri="{91240B29-F687-4F45-9708-019B960494DF}">
+              <a14:hiddenLine xmlns:a14="http://schemas.microsoft.com/office/drawing/2010/main" w="9525">
+                <a:solidFill>
+                  <a:schemeClr val="tx1"/>
+                </a:solidFill>
+                <a:miter lim="800000"/>
+                <a:headEnd/>
+                <a:tailEnd/>
+              </a14:hiddenLine>
+            </a:ext>
+            <a:ext uri="{AF507438-7753-43E0-B8FC-AC1667EBCBE1}">
+              <a14:hiddenEffects xmlns:a14="http://schemas.microsoft.com/office/drawing/2010/main">
+                <a:effectLst>
+                  <a:outerShdw dist="35921" dir="2700000" algn="ctr" rotWithShape="0">
+                    <a:schemeClr val="bg2"/>
+                  </a:outerShdw>
+                </a:effectLst>
+              </a14:hiddenEffects>
+            </a:ext>
+          </a:extLst>
+        </p:spPr>
+        <p:txBody>
+          <a:bodyPr vert="horz" wrap="none" lIns="91440" tIns="45720" rIns="91440" bIns="45720" numCol="1" anchor="ctr" anchorCtr="0" compatLnSpc="1">
+            <a:prstTxWarp prst="textNoShape">
+              <a:avLst/>
+            </a:prstTxWarp>
+            <a:spAutoFit/>
+          </a:bodyPr>
+          <a:lstStyle/>
+          <a:p>
+            <a:pPr marL="0" marR="0" lvl="0" indent="0" algn="l" defTabSz="914400" rtl="0" eaLnBrk="0" fontAlgn="base" latinLnBrk="0" hangingPunct="0">
+              <a:lnSpc>
+                <a:spcPct val="100000"/>
+              </a:lnSpc>
+              <a:spcBef>
+                <a:spcPct val="0"/>
+              </a:spcBef>
+              <a:spcAft>
+                <a:spcPct val="0"/>
+              </a:spcAft>
+              <a:buClrTx/>
+              <a:buSzTx/>
+              <a:buFontTx/>
+              <a:buChar char="•"/>
+              <a:tabLst/>
+            </a:pPr>
+            <a:r>
+              <a:rPr kumimoji="0" lang="fr-FR" altLang="fr-FR" sz="1800" b="1" i="0" u="none" strike="noStrike" cap="none" normalizeH="0" baseline="0" dirty="0">
+                <a:ln>
+                  <a:noFill/>
+                </a:ln>
+                <a:solidFill>
+                  <a:schemeClr val="tx1"/>
+                </a:solidFill>
+                <a:effectLst/>
+                <a:latin typeface="Arial" panose="020B0604020202020204" pitchFamily="34" charset="0"/>
+              </a:rPr>
+              <a:t>SOLUTION</a:t>
+            </a:r>
+            <a:endParaRPr kumimoji="0" lang="fr-FR" altLang="fr-FR" sz="1800" b="0" i="0" u="none" strike="noStrike" cap="none" normalizeH="0" baseline="0" dirty="0">
+              <a:ln>
+                <a:noFill/>
+              </a:ln>
+              <a:solidFill>
+                <a:schemeClr val="tx1"/>
+              </a:solidFill>
+              <a:effectLst/>
+              <a:latin typeface="Arial" panose="020B0604020202020204" pitchFamily="34" charset="0"/>
+            </a:endParaRPr>
+          </a:p>
+          <a:p>
+            <a:pPr marL="0" marR="0" lvl="0" indent="0" algn="l" defTabSz="914400" rtl="0" eaLnBrk="0" fontAlgn="base" latinLnBrk="0" hangingPunct="0">
+              <a:lnSpc>
+                <a:spcPct val="100000"/>
+              </a:lnSpc>
+              <a:spcBef>
+                <a:spcPct val="0"/>
+              </a:spcBef>
+              <a:spcAft>
+                <a:spcPct val="0"/>
+              </a:spcAft>
+              <a:buClrTx/>
+              <a:buSzTx/>
+              <a:buFontTx/>
+              <a:buAutoNum type="arabicPeriod"/>
+              <a:tabLst/>
+            </a:pPr>
+            <a:r>
+              <a:rPr kumimoji="0" lang="fr-FR" altLang="fr-FR" sz="1000" b="0" i="0" u="none" strike="noStrike" cap="none" normalizeH="0" baseline="0" dirty="0" err="1">
+                <a:ln>
+                  <a:noFill/>
+                </a:ln>
+                <a:solidFill>
+                  <a:schemeClr val="tx1"/>
+                </a:solidFill>
+                <a:effectLst/>
+                <a:latin typeface="Arial Unicode MS"/>
+              </a:rPr>
+              <a:t>ma_liste</a:t>
+            </a:r>
+            <a:r>
+              <a:rPr kumimoji="0" lang="fr-FR" altLang="fr-FR" sz="1000" b="0" i="0" u="none" strike="noStrike" cap="none" normalizeH="0" baseline="0" dirty="0">
+                <a:ln>
+                  <a:noFill/>
+                </a:ln>
+                <a:solidFill>
+                  <a:schemeClr val="tx1"/>
+                </a:solidFill>
+                <a:effectLst/>
+                <a:latin typeface="Arial Unicode MS"/>
+              </a:rPr>
+              <a:t> = ["Pierre", "Paul", "Marie"]</a:t>
+            </a:r>
+          </a:p>
+          <a:p>
+            <a:pPr marL="0" marR="0" lvl="0" indent="0" algn="l" defTabSz="914400" rtl="0" eaLnBrk="0" fontAlgn="base" latinLnBrk="0" hangingPunct="0">
+              <a:lnSpc>
+                <a:spcPct val="100000"/>
+              </a:lnSpc>
+              <a:spcBef>
+                <a:spcPct val="0"/>
+              </a:spcBef>
+              <a:spcAft>
+                <a:spcPct val="0"/>
+              </a:spcAft>
+              <a:buClrTx/>
+              <a:buSzTx/>
+              <a:buFontTx/>
+              <a:buAutoNum type="arabicPeriod" startAt="2"/>
+              <a:tabLst/>
+            </a:pPr>
+            <a:r>
+              <a:rPr kumimoji="0" lang="fr-FR" altLang="fr-FR" sz="1000" b="0" i="0" u="none" strike="noStrike" cap="none" normalizeH="0" baseline="0" dirty="0" err="1">
+                <a:ln>
+                  <a:noFill/>
+                </a:ln>
+                <a:solidFill>
+                  <a:schemeClr val="tx1"/>
+                </a:solidFill>
+                <a:effectLst/>
+                <a:latin typeface="Arial Unicode MS"/>
+              </a:rPr>
+              <a:t>print</a:t>
+            </a:r>
+            <a:r>
+              <a:rPr kumimoji="0" lang="fr-FR" altLang="fr-FR" sz="1000" b="0" i="0" u="none" strike="noStrike" cap="none" normalizeH="0" baseline="0" dirty="0">
+                <a:ln>
+                  <a:noFill/>
+                </a:ln>
+                <a:solidFill>
+                  <a:schemeClr val="tx1"/>
+                </a:solidFill>
+                <a:effectLst/>
+                <a:latin typeface="Arial Unicode MS"/>
+              </a:rPr>
+              <a:t>(</a:t>
+            </a:r>
+            <a:r>
+              <a:rPr kumimoji="0" lang="fr-FR" altLang="fr-FR" sz="1000" b="0" i="0" u="none" strike="noStrike" cap="none" normalizeH="0" baseline="0" dirty="0" err="1">
+                <a:ln>
+                  <a:noFill/>
+                </a:ln>
+                <a:solidFill>
+                  <a:schemeClr val="tx1"/>
+                </a:solidFill>
+                <a:effectLst/>
+                <a:latin typeface="Arial Unicode MS"/>
+              </a:rPr>
+              <a:t>ma_liste</a:t>
+            </a:r>
+            <a:r>
+              <a:rPr kumimoji="0" lang="fr-FR" altLang="fr-FR" sz="1000" b="0" i="0" u="none" strike="noStrike" cap="none" normalizeH="0" baseline="0" dirty="0">
+                <a:ln>
+                  <a:noFill/>
+                </a:ln>
+                <a:solidFill>
+                  <a:schemeClr val="tx1"/>
+                </a:solidFill>
+                <a:effectLst/>
+                <a:latin typeface="Arial Unicode MS"/>
+              </a:rPr>
+              <a:t>[0])</a:t>
+            </a:r>
+          </a:p>
+          <a:p>
+            <a:pPr marL="0" marR="0" lvl="0" indent="0" algn="l" defTabSz="914400" rtl="0" eaLnBrk="0" fontAlgn="base" latinLnBrk="0" hangingPunct="0">
+              <a:lnSpc>
+                <a:spcPct val="100000"/>
+              </a:lnSpc>
+              <a:spcBef>
+                <a:spcPct val="0"/>
+              </a:spcBef>
+              <a:spcAft>
+                <a:spcPct val="0"/>
+              </a:spcAft>
+              <a:buClrTx/>
+              <a:buSzTx/>
+              <a:buFontTx/>
+              <a:buChar char="•"/>
+              <a:tabLst/>
+            </a:pPr>
+            <a:endParaRPr kumimoji="0" lang="fr-FR" altLang="fr-FR" sz="600" b="1" i="0" u="none" strike="noStrike" cap="none" normalizeH="0" baseline="0" dirty="0">
+              <a:ln>
+                <a:noFill/>
+              </a:ln>
+              <a:solidFill>
+                <a:schemeClr val="tx1"/>
+              </a:solidFill>
+              <a:effectLst/>
+            </a:endParaRPr>
+          </a:p>
+          <a:p>
+            <a:pPr marL="0" indent="0" eaLnBrk="0" fontAlgn="base" hangingPunct="0">
+              <a:spcBef>
+                <a:spcPct val="0"/>
+              </a:spcBef>
+              <a:spcAft>
+                <a:spcPct val="0"/>
+              </a:spcAft>
+              <a:buFontTx/>
+              <a:buChar char="•"/>
+            </a:pPr>
+            <a:r>
+              <a:rPr lang="fr-FR" altLang="fr-FR" sz="1800" b="1" dirty="0">
+                <a:latin typeface="Arial" panose="020B0604020202020204" pitchFamily="34" charset="0"/>
+              </a:rPr>
+              <a:t>EXPLICATION</a:t>
+            </a:r>
+          </a:p>
+          <a:p>
+            <a:pPr marL="0" marR="0" lvl="0" indent="0" algn="l" defTabSz="914400" rtl="0" eaLnBrk="0" fontAlgn="base" latinLnBrk="0" hangingPunct="0">
+              <a:lnSpc>
+                <a:spcPct val="100000"/>
+              </a:lnSpc>
+              <a:spcBef>
+                <a:spcPct val="0"/>
+              </a:spcBef>
+              <a:spcAft>
+                <a:spcPct val="0"/>
+              </a:spcAft>
+              <a:buClrTx/>
+              <a:buSzTx/>
+              <a:buFontTx/>
+              <a:buNone/>
+              <a:tabLst/>
+            </a:pPr>
+            <a:r>
+              <a:rPr kumimoji="0" lang="fr-FR" altLang="fr-FR" sz="1200" b="0" i="0" u="none" strike="noStrike" cap="none" normalizeH="0" baseline="0" dirty="0">
+                <a:ln>
+                  <a:noFill/>
+                </a:ln>
+                <a:solidFill>
+                  <a:schemeClr val="tx1"/>
+                </a:solidFill>
+                <a:effectLst/>
+                <a:latin typeface="Arial" panose="020B0604020202020204" pitchFamily="34" charset="0"/>
+              </a:rPr>
+              <a:t>Exercice très simple pour les gens habitués à utiliser Python.</a:t>
+            </a:r>
+          </a:p>
+          <a:p>
+            <a:pPr marL="0" marR="0" lvl="0" indent="0" algn="l" defTabSz="914400" rtl="0" eaLnBrk="0" fontAlgn="base" latinLnBrk="0" hangingPunct="0">
+              <a:lnSpc>
+                <a:spcPct val="100000"/>
+              </a:lnSpc>
+              <a:spcBef>
+                <a:spcPct val="0"/>
+              </a:spcBef>
+              <a:spcAft>
+                <a:spcPct val="0"/>
+              </a:spcAft>
+              <a:buClrTx/>
+              <a:buSzTx/>
+              <a:buFontTx/>
+              <a:buNone/>
+              <a:tabLst/>
+            </a:pPr>
+            <a:r>
+              <a:rPr kumimoji="0" lang="fr-FR" altLang="fr-FR" sz="1200" b="0" i="0" u="none" strike="noStrike" cap="none" normalizeH="0" baseline="0" dirty="0">
+                <a:ln>
+                  <a:noFill/>
+                </a:ln>
+                <a:solidFill>
+                  <a:schemeClr val="tx1"/>
+                </a:solidFill>
+                <a:effectLst/>
+                <a:latin typeface="Arial" panose="020B0604020202020204" pitchFamily="34" charset="0"/>
+              </a:rPr>
+              <a:t>Pour récupérer un élément dans une liste basé sur sa position dans la liste, </a:t>
+            </a:r>
+            <a:r>
+              <a:rPr kumimoji="0" lang="fr-FR" altLang="fr-FR" sz="1200" b="1" i="0" u="none" strike="noStrike" cap="none" normalizeH="0" baseline="0" dirty="0">
+                <a:ln>
+                  <a:noFill/>
+                </a:ln>
+                <a:solidFill>
+                  <a:schemeClr val="tx1"/>
+                </a:solidFill>
+                <a:effectLst/>
+                <a:latin typeface="Arial" panose="020B0604020202020204" pitchFamily="34" charset="0"/>
+              </a:rPr>
+              <a:t>on utilise les crochets</a:t>
+            </a:r>
+            <a:r>
+              <a:rPr kumimoji="0" lang="fr-FR" altLang="fr-FR" sz="1200" b="0" i="0" u="none" strike="noStrike" cap="none" normalizeH="0" baseline="0" dirty="0">
+                <a:ln>
+                  <a:noFill/>
+                </a:ln>
+                <a:solidFill>
+                  <a:schemeClr val="tx1"/>
+                </a:solidFill>
+                <a:effectLst/>
+                <a:latin typeface="Arial" panose="020B0604020202020204" pitchFamily="34" charset="0"/>
+              </a:rPr>
+              <a:t> : []</a:t>
+            </a:r>
+          </a:p>
+          <a:p>
+            <a:pPr marL="0" marR="0" lvl="0" indent="0" algn="l" defTabSz="914400" rtl="0" eaLnBrk="0" fontAlgn="base" latinLnBrk="0" hangingPunct="0">
+              <a:lnSpc>
+                <a:spcPct val="100000"/>
+              </a:lnSpc>
+              <a:spcBef>
+                <a:spcPct val="0"/>
+              </a:spcBef>
+              <a:spcAft>
+                <a:spcPct val="0"/>
+              </a:spcAft>
+              <a:buClrTx/>
+              <a:buSzTx/>
+              <a:buFontTx/>
+              <a:buNone/>
+              <a:tabLst/>
+            </a:pPr>
+            <a:r>
+              <a:rPr kumimoji="0" lang="fr-FR" altLang="fr-FR" sz="1200" b="0" i="0" u="none" strike="noStrike" cap="none" normalizeH="0" baseline="0" dirty="0">
+                <a:ln>
+                  <a:noFill/>
+                </a:ln>
+                <a:solidFill>
+                  <a:schemeClr val="tx1"/>
+                </a:solidFill>
+                <a:effectLst/>
+                <a:latin typeface="Arial" panose="020B0604020202020204" pitchFamily="34" charset="0"/>
+              </a:rPr>
+              <a:t>Il suffit ensuite d'indiquer à l'intérieur des crochets</a:t>
+            </a:r>
+            <a:r>
+              <a:rPr kumimoji="0" lang="fr-FR" altLang="fr-FR" sz="1200" b="1" i="0" u="none" strike="noStrike" cap="none" normalizeH="0" baseline="0" dirty="0">
+                <a:ln>
+                  <a:noFill/>
+                </a:ln>
+                <a:solidFill>
+                  <a:schemeClr val="tx1"/>
+                </a:solidFill>
+                <a:effectLst/>
+                <a:latin typeface="Arial" panose="020B0604020202020204" pitchFamily="34" charset="0"/>
+              </a:rPr>
+              <a:t> l'indice de l'élément </a:t>
+            </a:r>
+            <a:r>
+              <a:rPr kumimoji="0" lang="fr-FR" altLang="fr-FR" sz="1200" b="0" i="0" u="none" strike="noStrike" cap="none" normalizeH="0" baseline="0" dirty="0">
+                <a:ln>
+                  <a:noFill/>
+                </a:ln>
+                <a:solidFill>
+                  <a:schemeClr val="tx1"/>
+                </a:solidFill>
+                <a:effectLst/>
+                <a:latin typeface="Arial" panose="020B0604020202020204" pitchFamily="34" charset="0"/>
+              </a:rPr>
+              <a:t>qu'on veut récupérer.</a:t>
+            </a:r>
+          </a:p>
+          <a:p>
+            <a:pPr marL="0" marR="0" lvl="0" indent="0" algn="l" defTabSz="914400" rtl="0" eaLnBrk="0" fontAlgn="base" latinLnBrk="0" hangingPunct="0">
+              <a:lnSpc>
+                <a:spcPct val="100000"/>
+              </a:lnSpc>
+              <a:spcBef>
+                <a:spcPct val="0"/>
+              </a:spcBef>
+              <a:spcAft>
+                <a:spcPct val="0"/>
+              </a:spcAft>
+              <a:buClrTx/>
+              <a:buSzTx/>
+              <a:buFontTx/>
+              <a:buNone/>
+              <a:tabLst/>
+            </a:pPr>
+            <a:r>
+              <a:rPr kumimoji="0" lang="fr-FR" altLang="fr-FR" sz="1200" b="0" i="0" u="none" strike="noStrike" cap="none" normalizeH="0" baseline="0" dirty="0">
+                <a:ln>
+                  <a:noFill/>
+                </a:ln>
+                <a:solidFill>
+                  <a:schemeClr val="tx1"/>
+                </a:solidFill>
+                <a:effectLst/>
+                <a:latin typeface="Arial" panose="020B0604020202020204" pitchFamily="34" charset="0"/>
+              </a:rPr>
+              <a:t>Ici, pour récupérer le premier élément de la liste, on utilise donc la syntaxe suivante :</a:t>
+            </a:r>
+          </a:p>
+          <a:p>
+            <a:pPr marL="0" marR="0" lvl="0" indent="0" algn="l" defTabSz="914400" rtl="0" eaLnBrk="0" fontAlgn="base" latinLnBrk="0" hangingPunct="0">
+              <a:lnSpc>
+                <a:spcPct val="100000"/>
+              </a:lnSpc>
+              <a:spcBef>
+                <a:spcPct val="0"/>
+              </a:spcBef>
+              <a:spcAft>
+                <a:spcPct val="0"/>
+              </a:spcAft>
+              <a:buClrTx/>
+              <a:buSzTx/>
+              <a:buFontTx/>
+              <a:buNone/>
+              <a:tabLst/>
+            </a:pPr>
+            <a:r>
+              <a:rPr kumimoji="0" lang="fr-FR" altLang="fr-FR" sz="1000" b="0" i="0" u="none" strike="noStrike" cap="none" normalizeH="0" baseline="0" dirty="0" err="1">
+                <a:ln>
+                  <a:noFill/>
+                </a:ln>
+                <a:solidFill>
+                  <a:schemeClr val="tx1"/>
+                </a:solidFill>
+                <a:effectLst/>
+                <a:latin typeface="Arial Unicode MS"/>
+              </a:rPr>
+              <a:t>ma_liste</a:t>
+            </a:r>
+            <a:r>
+              <a:rPr kumimoji="0" lang="fr-FR" altLang="fr-FR" sz="1000" b="0" i="0" u="none" strike="noStrike" cap="none" normalizeH="0" baseline="0" dirty="0">
+                <a:ln>
+                  <a:noFill/>
+                </a:ln>
+                <a:solidFill>
+                  <a:schemeClr val="tx1"/>
+                </a:solidFill>
+                <a:effectLst/>
+                <a:latin typeface="Arial Unicode MS"/>
+              </a:rPr>
+              <a:t>[0]</a:t>
+            </a:r>
+            <a:r>
+              <a:rPr kumimoji="0" lang="fr-FR" altLang="fr-FR" sz="600" b="0" i="0" u="none" strike="noStrike" cap="none" normalizeH="0" baseline="0" dirty="0">
+                <a:ln>
+                  <a:noFill/>
+                </a:ln>
+                <a:solidFill>
+                  <a:schemeClr val="tx1"/>
+                </a:solidFill>
+                <a:effectLst/>
+              </a:rPr>
+              <a:t> </a:t>
+            </a:r>
+            <a:endParaRPr kumimoji="0" lang="fr-FR" altLang="fr-FR" sz="1800" b="0" i="0" u="none" strike="noStrike" cap="none" normalizeH="0" baseline="0" dirty="0">
+              <a:ln>
+                <a:noFill/>
+              </a:ln>
+              <a:solidFill>
+                <a:schemeClr val="tx1"/>
+              </a:solidFill>
+              <a:effectLst/>
+              <a:latin typeface="Arial" panose="020B0604020202020204" pitchFamily="34" charset="0"/>
+            </a:endParaRPr>
+          </a:p>
+          <a:p>
+            <a:pPr marL="0" marR="0" lvl="0" indent="0" algn="l" defTabSz="914400" rtl="0" eaLnBrk="0" fontAlgn="base" latinLnBrk="0" hangingPunct="0">
+              <a:lnSpc>
+                <a:spcPct val="100000"/>
+              </a:lnSpc>
+              <a:spcBef>
+                <a:spcPct val="0"/>
+              </a:spcBef>
+              <a:spcAft>
+                <a:spcPct val="0"/>
+              </a:spcAft>
+              <a:buClrTx/>
+              <a:buSzTx/>
+              <a:buFontTx/>
+              <a:buNone/>
+              <a:tabLst/>
+            </a:pPr>
+            <a:r>
+              <a:rPr kumimoji="0" lang="fr-FR" altLang="fr-FR" sz="1200" b="0" i="0" u="none" strike="noStrike" cap="none" normalizeH="0" baseline="0" dirty="0">
+                <a:ln>
+                  <a:noFill/>
+                </a:ln>
+                <a:solidFill>
+                  <a:schemeClr val="tx1"/>
+                </a:solidFill>
+                <a:effectLst/>
+                <a:latin typeface="Arial" panose="020B0604020202020204" pitchFamily="34" charset="0"/>
+              </a:rPr>
+              <a:t>Le seul point sur lequel il fallait être attentif est le fait qu'en programmation </a:t>
+            </a:r>
+            <a:r>
+              <a:rPr kumimoji="0" lang="fr-FR" altLang="fr-FR" sz="1200" b="1" i="0" u="none" strike="noStrike" cap="none" normalizeH="0" baseline="0" dirty="0">
+                <a:ln>
+                  <a:noFill/>
+                </a:ln>
+                <a:solidFill>
+                  <a:schemeClr val="tx1"/>
+                </a:solidFill>
+                <a:effectLst/>
+                <a:latin typeface="Arial" panose="020B0604020202020204" pitchFamily="34" charset="0"/>
+              </a:rPr>
+              <a:t>on commence toujours à compter à partir de 0</a:t>
+            </a:r>
+            <a:r>
+              <a:rPr kumimoji="0" lang="fr-FR" altLang="fr-FR" sz="1200" b="0" i="0" u="none" strike="noStrike" cap="none" normalizeH="0" baseline="0" dirty="0">
+                <a:ln>
+                  <a:noFill/>
+                </a:ln>
+                <a:solidFill>
+                  <a:schemeClr val="tx1"/>
+                </a:solidFill>
+                <a:effectLst/>
+                <a:latin typeface="Arial" panose="020B0604020202020204" pitchFamily="34" charset="0"/>
+              </a:rPr>
+              <a:t>.</a:t>
+            </a:r>
+          </a:p>
+          <a:p>
+            <a:pPr marL="0" marR="0" lvl="0" indent="0" algn="l" defTabSz="914400" rtl="0" eaLnBrk="0" fontAlgn="base" latinLnBrk="0" hangingPunct="0">
+              <a:lnSpc>
+                <a:spcPct val="100000"/>
+              </a:lnSpc>
+              <a:spcBef>
+                <a:spcPct val="0"/>
+              </a:spcBef>
+              <a:spcAft>
+                <a:spcPct val="0"/>
+              </a:spcAft>
+              <a:buClrTx/>
+              <a:buSzTx/>
+              <a:buFontTx/>
+              <a:buNone/>
+              <a:tabLst/>
+            </a:pPr>
+            <a:r>
+              <a:rPr kumimoji="0" lang="fr-FR" altLang="fr-FR" sz="1200" b="0" i="0" u="none" strike="noStrike" cap="none" normalizeH="0" baseline="0" dirty="0">
+                <a:ln>
+                  <a:noFill/>
+                </a:ln>
+                <a:solidFill>
+                  <a:schemeClr val="tx1"/>
+                </a:solidFill>
+                <a:effectLst/>
+                <a:latin typeface="Arial" panose="020B0604020202020204" pitchFamily="34" charset="0"/>
+              </a:rPr>
+              <a:t>Ainsi, pour récupérer le premier élément de la liste, </a:t>
+            </a:r>
+            <a:r>
+              <a:rPr kumimoji="0" lang="fr-FR" altLang="fr-FR" sz="1200" b="1" i="0" u="none" strike="noStrike" cap="none" normalizeH="0" baseline="0" dirty="0">
+                <a:ln>
+                  <a:noFill/>
+                </a:ln>
+                <a:solidFill>
+                  <a:schemeClr val="tx1"/>
+                </a:solidFill>
+                <a:effectLst/>
+                <a:latin typeface="Arial" panose="020B0604020202020204" pitchFamily="34" charset="0"/>
+              </a:rPr>
+              <a:t>on utilise l'indice 0 et non 1</a:t>
+            </a:r>
+            <a:r>
+              <a:rPr kumimoji="0" lang="fr-FR" altLang="fr-FR" sz="1200" b="0" i="0" u="none" strike="noStrike" cap="none" normalizeH="0" baseline="0" dirty="0">
+                <a:ln>
+                  <a:noFill/>
+                </a:ln>
+                <a:solidFill>
+                  <a:schemeClr val="tx1"/>
+                </a:solidFill>
+                <a:effectLst/>
+                <a:latin typeface="Arial" panose="020B0604020202020204" pitchFamily="34" charset="0"/>
+              </a:rPr>
+              <a:t>.</a:t>
+            </a:r>
+          </a:p>
+          <a:p>
+            <a:pPr marL="0" marR="0" lvl="0" indent="0" algn="l" defTabSz="914400" rtl="0" eaLnBrk="0" fontAlgn="base" latinLnBrk="0" hangingPunct="0">
+              <a:lnSpc>
+                <a:spcPct val="100000"/>
+              </a:lnSpc>
+              <a:spcBef>
+                <a:spcPct val="0"/>
+              </a:spcBef>
+              <a:spcAft>
+                <a:spcPct val="0"/>
+              </a:spcAft>
+              <a:buClrTx/>
+              <a:buSzTx/>
+              <a:buFontTx/>
+              <a:buChar char="•"/>
+              <a:tabLst/>
+            </a:pPr>
+            <a:endParaRPr kumimoji="0" lang="fr-FR" altLang="fr-FR" sz="1200" b="1" i="0" u="none" strike="noStrike" cap="none" normalizeH="0" baseline="0" dirty="0">
+              <a:ln>
+                <a:noFill/>
+              </a:ln>
+              <a:solidFill>
+                <a:schemeClr val="tx1"/>
+              </a:solidFill>
+              <a:effectLst/>
+              <a:latin typeface="Arial" panose="020B0604020202020204" pitchFamily="34" charset="0"/>
+            </a:endParaRPr>
+          </a:p>
+          <a:p>
+            <a:pPr marL="0" marR="0" lvl="0" indent="0" algn="l" defTabSz="914400" rtl="0" eaLnBrk="0" fontAlgn="base" latinLnBrk="0" hangingPunct="0">
+              <a:lnSpc>
+                <a:spcPct val="100000"/>
+              </a:lnSpc>
+              <a:spcBef>
+                <a:spcPct val="0"/>
+              </a:spcBef>
+              <a:spcAft>
+                <a:spcPct val="0"/>
+              </a:spcAft>
+              <a:buClrTx/>
+              <a:buSzTx/>
+              <a:buFontTx/>
+              <a:buChar char="•"/>
+              <a:tabLst/>
+            </a:pPr>
+            <a:r>
+              <a:rPr kumimoji="0" lang="fr-FR" altLang="fr-FR" sz="1200" b="1" i="0" u="none" strike="noStrike" cap="none" normalizeH="0" baseline="0" dirty="0">
+                <a:ln>
+                  <a:noFill/>
+                </a:ln>
+                <a:solidFill>
+                  <a:schemeClr val="tx1"/>
+                </a:solidFill>
+                <a:effectLst/>
+                <a:latin typeface="Arial" panose="020B0604020202020204" pitchFamily="34" charset="0"/>
+              </a:rPr>
+              <a:t>POINTS IMPORTANTS À RETENIR</a:t>
+            </a:r>
+            <a:endParaRPr kumimoji="0" lang="fr-FR" altLang="fr-FR" sz="1200" b="0" i="0" u="none" strike="noStrike" cap="none" normalizeH="0" baseline="0" dirty="0">
+              <a:ln>
+                <a:noFill/>
+              </a:ln>
+              <a:solidFill>
+                <a:schemeClr val="tx1"/>
+              </a:solidFill>
+              <a:effectLst/>
+              <a:latin typeface="Arial" panose="020B0604020202020204" pitchFamily="34" charset="0"/>
+            </a:endParaRPr>
+          </a:p>
+          <a:p>
+            <a:pPr marL="0" marR="0" lvl="0" indent="0" algn="l" defTabSz="914400" rtl="0" eaLnBrk="0" fontAlgn="base" latinLnBrk="0" hangingPunct="0">
+              <a:lnSpc>
+                <a:spcPct val="100000"/>
+              </a:lnSpc>
+              <a:spcBef>
+                <a:spcPct val="0"/>
+              </a:spcBef>
+              <a:spcAft>
+                <a:spcPct val="0"/>
+              </a:spcAft>
+              <a:buClrTx/>
+              <a:buSzTx/>
+              <a:buFontTx/>
+              <a:buAutoNum type="arabicPeriod"/>
+              <a:tabLst/>
+            </a:pPr>
+            <a:r>
+              <a:rPr kumimoji="0" lang="fr-FR" altLang="fr-FR" sz="1200" b="0" i="0" u="none" strike="noStrike" cap="none" normalizeH="0" baseline="0" dirty="0">
+                <a:ln>
+                  <a:noFill/>
+                </a:ln>
+                <a:solidFill>
+                  <a:schemeClr val="tx1"/>
+                </a:solidFill>
+                <a:effectLst/>
+                <a:latin typeface="Arial" panose="020B0604020202020204" pitchFamily="34" charset="0"/>
+              </a:rPr>
+              <a:t>Pour récupérer le premier élément de la liste, on utilise les crochets et l'indice 0.</a:t>
+            </a:r>
+          </a:p>
+          <a:p>
+            <a:pPr marL="0" marR="0" lvl="0" indent="0" algn="l" defTabSz="914400" rtl="0" eaLnBrk="0" fontAlgn="base" latinLnBrk="0" hangingPunct="0">
+              <a:lnSpc>
+                <a:spcPct val="100000"/>
+              </a:lnSpc>
+              <a:spcBef>
+                <a:spcPct val="0"/>
+              </a:spcBef>
+              <a:spcAft>
+                <a:spcPct val="0"/>
+              </a:spcAft>
+              <a:buClrTx/>
+              <a:buSzTx/>
+              <a:buFontTx/>
+              <a:buNone/>
+              <a:tabLst/>
+            </a:pPr>
+            <a:endParaRPr kumimoji="0" lang="fr-FR" altLang="fr-FR" sz="1800" b="0" i="0" u="none" strike="noStrike" cap="none" normalizeH="0" baseline="0" dirty="0">
+              <a:ln>
+                <a:noFill/>
+              </a:ln>
+              <a:solidFill>
+                <a:schemeClr val="tx1"/>
+              </a:solidFill>
+              <a:effectLst/>
+              <a:latin typeface="Arial" panose="020B0604020202020204" pitchFamily="34" charset="0"/>
+            </a:endParaRPr>
+          </a:p>
+        </p:txBody>
+      </p:sp>
+    </p:spTree>
+    <p:extLst>
+      <p:ext uri="{BB962C8B-B14F-4D97-AF65-F5344CB8AC3E}">
+        <p14:creationId xmlns:p14="http://schemas.microsoft.com/office/powerpoint/2010/main" val="2795923792"/>
+      </p:ext>
+    </p:extLst>
+  </p:cSld>
+  <p:clrMapOvr>
+    <a:masterClrMapping/>
+  </p:clrMapOvr>
+</p:sld>
+</file>
+
+<file path=ppt/slides/slide65.xml><?xml version="1.0" encoding="utf-8"?>
+<p:sld xmlns:a="http://schemas.openxmlformats.org/drawingml/2006/main" xmlns:r="http://schemas.openxmlformats.org/officeDocument/2006/relationships" xmlns:p="http://schemas.openxmlformats.org/presentationml/2006/main">
+  <p:cSld>
+    <p:spTree>
+      <p:nvGrpSpPr>
+        <p:cNvPr id="1" name=""/>
+        <p:cNvGrpSpPr/>
+        <p:nvPr/>
+      </p:nvGrpSpPr>
+      <p:grpSpPr>
+        <a:xfrm>
+          <a:off x="0" y="0"/>
+          <a:ext cx="0" cy="0"/>
+          <a:chOff x="0" y="0"/>
+          <a:chExt cx="0" cy="0"/>
+        </a:xfrm>
+      </p:grpSpPr>
+      <p:sp>
+        <p:nvSpPr>
+          <p:cNvPr id="2" name="Titre 1">
+            <a:extLst>
+              <a:ext uri="{FF2B5EF4-FFF2-40B4-BE49-F238E27FC236}">
+                <a16:creationId xmlns:a16="http://schemas.microsoft.com/office/drawing/2014/main" id="{7C7F7717-86C7-4F34-AE63-B691C95BE1BC}"/>
+              </a:ext>
+            </a:extLst>
+          </p:cNvPr>
+          <p:cNvSpPr>
+            <a:spLocks noGrp="1"/>
+          </p:cNvSpPr>
+          <p:nvPr>
+            <p:ph type="title"/>
+          </p:nvPr>
+        </p:nvSpPr>
+        <p:spPr/>
+        <p:txBody>
+          <a:bodyPr>
+            <a:normAutofit fontScale="90000"/>
+          </a:bodyPr>
+          <a:lstStyle/>
+          <a:p>
+            <a:r>
+              <a:rPr lang="fr-FR" altLang="fr-FR" sz="4000" dirty="0">
+                <a:latin typeface="Arial" panose="020B0604020202020204" pitchFamily="34" charset="0"/>
+              </a:rPr>
+              <a:t>Ajouter plusieurs éléments à une liste</a:t>
+            </a:r>
+            <a:br>
+              <a:rPr lang="fr-FR" altLang="fr-FR" dirty="0">
+                <a:latin typeface="Arial" panose="020B0604020202020204" pitchFamily="34" charset="0"/>
+              </a:rPr>
+            </a:br>
+            <a:endParaRPr lang="fr-FR" dirty="0"/>
+          </a:p>
+        </p:txBody>
+      </p:sp>
+      <p:sp>
+        <p:nvSpPr>
+          <p:cNvPr id="4" name="Rectangle 1">
+            <a:extLst>
+              <a:ext uri="{FF2B5EF4-FFF2-40B4-BE49-F238E27FC236}">
+                <a16:creationId xmlns:a16="http://schemas.microsoft.com/office/drawing/2014/main" id="{FF3D4F4F-BEB3-4AE0-A52E-4E5B65207F2F}"/>
+              </a:ext>
+            </a:extLst>
+          </p:cNvPr>
+          <p:cNvSpPr>
+            <a:spLocks noGrp="1" noChangeArrowheads="1"/>
+          </p:cNvSpPr>
+          <p:nvPr>
+            <p:ph idx="1"/>
+          </p:nvPr>
+        </p:nvSpPr>
+        <p:spPr bwMode="auto">
+          <a:xfrm>
+            <a:off x="457200" y="896840"/>
+            <a:ext cx="12776703" cy="4001095"/>
+          </a:xfrm>
+          <a:prstGeom prst="rect">
+            <a:avLst/>
+          </a:prstGeom>
+          <a:noFill/>
+          <a:ln>
+            <a:noFill/>
+          </a:ln>
+          <a:effectLst/>
+          <a:extLst>
+            <a:ext uri="{909E8E84-426E-40DD-AFC4-6F175D3DCCD1}">
+              <a14:hiddenFill xmlns:a14="http://schemas.microsoft.com/office/drawing/2010/main">
+                <a:solidFill>
+                  <a:schemeClr val="accent1"/>
+                </a:solidFill>
+              </a14:hiddenFill>
+            </a:ext>
+            <a:ext uri="{91240B29-F687-4F45-9708-019B960494DF}">
+              <a14:hiddenLine xmlns:a14="http://schemas.microsoft.com/office/drawing/2010/main" w="9525">
+                <a:solidFill>
+                  <a:schemeClr val="tx1"/>
+                </a:solidFill>
+                <a:miter lim="800000"/>
+                <a:headEnd/>
+                <a:tailEnd/>
+              </a14:hiddenLine>
+            </a:ext>
+            <a:ext uri="{AF507438-7753-43E0-B8FC-AC1667EBCBE1}">
+              <a14:hiddenEffects xmlns:a14="http://schemas.microsoft.com/office/drawing/2010/main">
+                <a:effectLst>
+                  <a:outerShdw dist="35921" dir="2700000" algn="ctr" rotWithShape="0">
+                    <a:schemeClr val="bg2"/>
+                  </a:outerShdw>
+                </a:effectLst>
+              </a14:hiddenEffects>
+            </a:ext>
+          </a:extLst>
+        </p:spPr>
+        <p:txBody>
+          <a:bodyPr vert="horz" wrap="none" lIns="91440" tIns="45720" rIns="91440" bIns="45720" numCol="1" anchor="ctr" anchorCtr="0" compatLnSpc="1">
+            <a:prstTxWarp prst="textNoShape">
+              <a:avLst/>
+            </a:prstTxWarp>
+            <a:spAutoFit/>
+          </a:bodyPr>
+          <a:lstStyle/>
+          <a:p>
+            <a:pPr marL="0" marR="0" lvl="0" indent="0" algn="l" defTabSz="914400" rtl="0" eaLnBrk="0" fontAlgn="base" latinLnBrk="0" hangingPunct="0">
+              <a:lnSpc>
+                <a:spcPct val="100000"/>
+              </a:lnSpc>
+              <a:spcBef>
+                <a:spcPct val="0"/>
+              </a:spcBef>
+              <a:spcAft>
+                <a:spcPct val="0"/>
+              </a:spcAft>
+              <a:buClrTx/>
+              <a:buSzTx/>
+              <a:buFontTx/>
+              <a:buChar char="•"/>
+              <a:tabLst/>
+            </a:pPr>
+            <a:r>
+              <a:rPr kumimoji="0" lang="fr-FR" altLang="fr-FR" sz="1800" b="1" i="0" u="none" strike="noStrike" cap="none" normalizeH="0" baseline="0" dirty="0">
+                <a:ln>
+                  <a:noFill/>
+                </a:ln>
+                <a:solidFill>
+                  <a:schemeClr val="tx1"/>
+                </a:solidFill>
+                <a:effectLst/>
+                <a:latin typeface="Arial" panose="020B0604020202020204" pitchFamily="34" charset="0"/>
+              </a:rPr>
+              <a:t>SOLUTION</a:t>
+            </a:r>
+            <a:endParaRPr kumimoji="0" lang="fr-FR" altLang="fr-FR" sz="1800" b="0" i="0" u="none" strike="noStrike" cap="none" normalizeH="0" baseline="0" dirty="0">
+              <a:ln>
+                <a:noFill/>
+              </a:ln>
+              <a:solidFill>
+                <a:schemeClr val="tx1"/>
+              </a:solidFill>
+              <a:effectLst/>
+              <a:latin typeface="Arial" panose="020B0604020202020204" pitchFamily="34" charset="0"/>
+            </a:endParaRPr>
+          </a:p>
+          <a:p>
+            <a:pPr marL="0" marR="0" lvl="0" indent="0" algn="l" defTabSz="914400" rtl="0" eaLnBrk="0" fontAlgn="base" latinLnBrk="0" hangingPunct="0">
+              <a:lnSpc>
+                <a:spcPct val="100000"/>
+              </a:lnSpc>
+              <a:spcBef>
+                <a:spcPct val="0"/>
+              </a:spcBef>
+              <a:spcAft>
+                <a:spcPct val="0"/>
+              </a:spcAft>
+              <a:buClrTx/>
+              <a:buSzTx/>
+              <a:buFontTx/>
+              <a:buAutoNum type="arabicPeriod"/>
+              <a:tabLst/>
+            </a:pPr>
+            <a:r>
+              <a:rPr kumimoji="0" lang="fr-FR" altLang="fr-FR" sz="1000" b="0" i="0" u="none" strike="noStrike" cap="none" normalizeH="0" baseline="0" dirty="0" err="1">
+                <a:ln>
+                  <a:noFill/>
+                </a:ln>
+                <a:solidFill>
+                  <a:schemeClr val="tx1"/>
+                </a:solidFill>
+                <a:effectLst/>
+                <a:latin typeface="Arial Unicode MS"/>
+              </a:rPr>
+              <a:t>ma_liste</a:t>
+            </a:r>
+            <a:r>
+              <a:rPr kumimoji="0" lang="fr-FR" altLang="fr-FR" sz="1000" b="0" i="0" u="none" strike="noStrike" cap="none" normalizeH="0" baseline="0" dirty="0">
+                <a:ln>
+                  <a:noFill/>
+                </a:ln>
+                <a:solidFill>
+                  <a:schemeClr val="tx1"/>
+                </a:solidFill>
+                <a:effectLst/>
+                <a:latin typeface="Arial Unicode MS"/>
+              </a:rPr>
+              <a:t> = [1, 2, 3]</a:t>
+            </a:r>
+          </a:p>
+          <a:p>
+            <a:pPr marL="0" marR="0" lvl="0" indent="0" algn="l" defTabSz="914400" rtl="0" eaLnBrk="0" fontAlgn="base" latinLnBrk="0" hangingPunct="0">
+              <a:lnSpc>
+                <a:spcPct val="100000"/>
+              </a:lnSpc>
+              <a:spcBef>
+                <a:spcPct val="0"/>
+              </a:spcBef>
+              <a:spcAft>
+                <a:spcPct val="0"/>
+              </a:spcAft>
+              <a:buClrTx/>
+              <a:buSzTx/>
+              <a:buFontTx/>
+              <a:buAutoNum type="arabicPeriod" startAt="2"/>
+              <a:tabLst/>
+            </a:pPr>
+            <a:r>
+              <a:rPr kumimoji="0" lang="fr-FR" altLang="fr-FR" sz="1000" b="0" i="0" u="none" strike="noStrike" cap="none" normalizeH="0" baseline="0" dirty="0" err="1">
+                <a:ln>
+                  <a:noFill/>
+                </a:ln>
+                <a:solidFill>
+                  <a:schemeClr val="tx1"/>
+                </a:solidFill>
+                <a:effectLst/>
+                <a:latin typeface="Arial Unicode MS"/>
+              </a:rPr>
+              <a:t>ma_liste.extend</a:t>
+            </a:r>
+            <a:r>
+              <a:rPr kumimoji="0" lang="fr-FR" altLang="fr-FR" sz="1000" b="0" i="0" u="none" strike="noStrike" cap="none" normalizeH="0" baseline="0" dirty="0">
+                <a:ln>
+                  <a:noFill/>
+                </a:ln>
+                <a:solidFill>
+                  <a:schemeClr val="tx1"/>
+                </a:solidFill>
+                <a:effectLst/>
+                <a:latin typeface="Arial Unicode MS"/>
+              </a:rPr>
+              <a:t>([4, 5, 6])</a:t>
+            </a:r>
+          </a:p>
+          <a:p>
+            <a:pPr marL="0" marR="0" lvl="0" indent="0" algn="l" defTabSz="914400" rtl="0" eaLnBrk="0" fontAlgn="base" latinLnBrk="0" hangingPunct="0">
+              <a:lnSpc>
+                <a:spcPct val="100000"/>
+              </a:lnSpc>
+              <a:spcBef>
+                <a:spcPct val="0"/>
+              </a:spcBef>
+              <a:spcAft>
+                <a:spcPct val="0"/>
+              </a:spcAft>
+              <a:buClrTx/>
+              <a:buSzTx/>
+              <a:buFontTx/>
+              <a:buAutoNum type="arabicPeriod" startAt="3"/>
+              <a:tabLst/>
+            </a:pPr>
+            <a:r>
+              <a:rPr kumimoji="0" lang="fr-FR" altLang="fr-FR" sz="1000" b="0" i="0" u="none" strike="noStrike" cap="none" normalizeH="0" baseline="0" dirty="0" err="1">
+                <a:ln>
+                  <a:noFill/>
+                </a:ln>
+                <a:solidFill>
+                  <a:schemeClr val="tx1"/>
+                </a:solidFill>
+                <a:effectLst/>
+                <a:latin typeface="Arial Unicode MS"/>
+              </a:rPr>
+              <a:t>print</a:t>
+            </a:r>
+            <a:r>
+              <a:rPr kumimoji="0" lang="fr-FR" altLang="fr-FR" sz="1000" b="0" i="0" u="none" strike="noStrike" cap="none" normalizeH="0" baseline="0" dirty="0">
+                <a:ln>
+                  <a:noFill/>
+                </a:ln>
+                <a:solidFill>
+                  <a:schemeClr val="tx1"/>
+                </a:solidFill>
+                <a:effectLst/>
+                <a:latin typeface="Arial Unicode MS"/>
+              </a:rPr>
+              <a:t>(</a:t>
+            </a:r>
+            <a:r>
+              <a:rPr kumimoji="0" lang="fr-FR" altLang="fr-FR" sz="1000" b="0" i="0" u="none" strike="noStrike" cap="none" normalizeH="0" baseline="0" dirty="0" err="1">
+                <a:ln>
+                  <a:noFill/>
+                </a:ln>
+                <a:solidFill>
+                  <a:schemeClr val="tx1"/>
+                </a:solidFill>
+                <a:effectLst/>
+                <a:latin typeface="Arial Unicode MS"/>
+              </a:rPr>
+              <a:t>ma_liste</a:t>
+            </a:r>
+            <a:r>
+              <a:rPr kumimoji="0" lang="fr-FR" altLang="fr-FR" sz="1000" b="0" i="0" u="none" strike="noStrike" cap="none" normalizeH="0" baseline="0" dirty="0">
+                <a:ln>
+                  <a:noFill/>
+                </a:ln>
+                <a:solidFill>
+                  <a:schemeClr val="tx1"/>
+                </a:solidFill>
+                <a:effectLst/>
+                <a:latin typeface="Arial Unicode MS"/>
+              </a:rPr>
+              <a:t>)</a:t>
+            </a:r>
+          </a:p>
+          <a:p>
+            <a:pPr marL="0" indent="0" eaLnBrk="0" fontAlgn="base" hangingPunct="0">
+              <a:spcBef>
+                <a:spcPct val="0"/>
+              </a:spcBef>
+              <a:spcAft>
+                <a:spcPct val="0"/>
+              </a:spcAft>
+              <a:buFontTx/>
+              <a:buChar char="•"/>
+            </a:pPr>
+            <a:endParaRPr lang="fr-FR" altLang="fr-FR" sz="1800" b="1" dirty="0">
+              <a:latin typeface="Arial" panose="020B0604020202020204" pitchFamily="34" charset="0"/>
+            </a:endParaRPr>
+          </a:p>
+          <a:p>
+            <a:pPr marL="0" indent="0" eaLnBrk="0" fontAlgn="base" hangingPunct="0">
+              <a:spcBef>
+                <a:spcPct val="0"/>
+              </a:spcBef>
+              <a:spcAft>
+                <a:spcPct val="0"/>
+              </a:spcAft>
+              <a:buFontTx/>
+              <a:buChar char="•"/>
+            </a:pPr>
+            <a:r>
+              <a:rPr lang="fr-FR" altLang="fr-FR" sz="1800" b="1" dirty="0">
+                <a:latin typeface="Arial" panose="020B0604020202020204" pitchFamily="34" charset="0"/>
+              </a:rPr>
+              <a:t>EXPLICATION</a:t>
+            </a:r>
+          </a:p>
+          <a:p>
+            <a:pPr marL="0" marR="0" lvl="0" indent="0" algn="l" defTabSz="914400" rtl="0" eaLnBrk="0" fontAlgn="base" latinLnBrk="0" hangingPunct="0">
+              <a:lnSpc>
+                <a:spcPct val="100000"/>
+              </a:lnSpc>
+              <a:spcBef>
+                <a:spcPct val="0"/>
+              </a:spcBef>
+              <a:spcAft>
+                <a:spcPct val="0"/>
+              </a:spcAft>
+              <a:buClrTx/>
+              <a:buSzTx/>
+              <a:buFontTx/>
+              <a:buNone/>
+              <a:tabLst/>
+            </a:pPr>
+            <a:r>
+              <a:rPr kumimoji="0" lang="fr-FR" altLang="fr-FR" sz="1200" b="0" i="0" u="none" strike="noStrike" cap="none" normalizeH="0" baseline="0" dirty="0">
+                <a:ln>
+                  <a:noFill/>
+                </a:ln>
+                <a:solidFill>
+                  <a:schemeClr val="tx1"/>
+                </a:solidFill>
+                <a:effectLst/>
+                <a:latin typeface="Arial" panose="020B0604020202020204" pitchFamily="34" charset="0"/>
+              </a:rPr>
+              <a:t>Pour </a:t>
+            </a:r>
+            <a:r>
+              <a:rPr kumimoji="0" lang="fr-FR" altLang="fr-FR" sz="1200" b="1" i="0" u="none" strike="noStrike" cap="none" normalizeH="0" baseline="0" dirty="0">
+                <a:ln>
+                  <a:noFill/>
+                </a:ln>
+                <a:solidFill>
+                  <a:schemeClr val="tx1"/>
+                </a:solidFill>
+                <a:effectLst/>
+                <a:latin typeface="Arial" panose="020B0604020202020204" pitchFamily="34" charset="0"/>
+              </a:rPr>
+              <a:t>ajouter plusieurs éléments </a:t>
+            </a:r>
+            <a:r>
+              <a:rPr kumimoji="0" lang="fr-FR" altLang="fr-FR" sz="1200" b="0" i="0" u="none" strike="noStrike" cap="none" normalizeH="0" baseline="0" dirty="0">
+                <a:ln>
+                  <a:noFill/>
+                </a:ln>
+                <a:solidFill>
+                  <a:schemeClr val="tx1"/>
+                </a:solidFill>
+                <a:effectLst/>
+                <a:latin typeface="Arial" panose="020B0604020202020204" pitchFamily="34" charset="0"/>
+              </a:rPr>
+              <a:t>dans une liste en une seule fois, </a:t>
+            </a:r>
+            <a:r>
+              <a:rPr kumimoji="0" lang="fr-FR" altLang="fr-FR" sz="1200" b="1" i="0" u="none" strike="noStrike" cap="none" normalizeH="0" baseline="0" dirty="0">
+                <a:ln>
+                  <a:noFill/>
+                </a:ln>
+                <a:solidFill>
+                  <a:schemeClr val="tx1"/>
+                </a:solidFill>
+                <a:effectLst/>
+                <a:latin typeface="Arial" panose="020B0604020202020204" pitchFamily="34" charset="0"/>
+              </a:rPr>
+              <a:t>on utilise la fonction </a:t>
+            </a:r>
+            <a:r>
+              <a:rPr kumimoji="0" lang="fr-FR" altLang="fr-FR" sz="1200" b="1" i="0" u="none" strike="noStrike" cap="none" normalizeH="0" baseline="0" dirty="0" err="1">
+                <a:ln>
+                  <a:noFill/>
+                </a:ln>
+                <a:solidFill>
+                  <a:schemeClr val="tx1"/>
+                </a:solidFill>
+                <a:effectLst/>
+                <a:latin typeface="Arial" panose="020B0604020202020204" pitchFamily="34" charset="0"/>
+              </a:rPr>
+              <a:t>extend</a:t>
+            </a:r>
+            <a:r>
+              <a:rPr kumimoji="0" lang="fr-FR" altLang="fr-FR" sz="1200" b="0" i="0" u="none" strike="noStrike" cap="none" normalizeH="0" baseline="0" dirty="0">
+                <a:ln>
+                  <a:noFill/>
+                </a:ln>
+                <a:solidFill>
+                  <a:schemeClr val="tx1"/>
+                </a:solidFill>
+                <a:effectLst/>
+                <a:latin typeface="Arial" panose="020B0604020202020204" pitchFamily="34" charset="0"/>
+              </a:rPr>
+              <a:t>.</a:t>
+            </a:r>
+          </a:p>
+          <a:p>
+            <a:pPr marL="0" marR="0" lvl="0" indent="0" algn="l" defTabSz="914400" rtl="0" eaLnBrk="0" fontAlgn="base" latinLnBrk="0" hangingPunct="0">
+              <a:lnSpc>
+                <a:spcPct val="100000"/>
+              </a:lnSpc>
+              <a:spcBef>
+                <a:spcPct val="0"/>
+              </a:spcBef>
+              <a:spcAft>
+                <a:spcPct val="0"/>
+              </a:spcAft>
+              <a:buClrTx/>
+              <a:buSzTx/>
+              <a:buFontTx/>
+              <a:buNone/>
+              <a:tabLst/>
+            </a:pPr>
+            <a:r>
+              <a:rPr kumimoji="0" lang="fr-FR" altLang="fr-FR" sz="1200" b="0" i="0" u="none" strike="noStrike" cap="none" normalizeH="0" baseline="0" dirty="0">
+                <a:ln>
+                  <a:noFill/>
+                </a:ln>
+                <a:solidFill>
+                  <a:schemeClr val="tx1"/>
+                </a:solidFill>
+                <a:effectLst/>
+                <a:latin typeface="Arial" panose="020B0604020202020204" pitchFamily="34" charset="0"/>
+              </a:rPr>
+              <a:t>En effet, si vous utilisez la fonction append, vous allez ajouter </a:t>
+            </a:r>
+            <a:r>
+              <a:rPr kumimoji="0" lang="fr-FR" altLang="fr-FR" sz="1200" b="1" i="0" u="none" strike="noStrike" cap="none" normalizeH="0" baseline="0" dirty="0">
+                <a:ln>
+                  <a:noFill/>
+                </a:ln>
+                <a:solidFill>
+                  <a:schemeClr val="tx1"/>
+                </a:solidFill>
+                <a:effectLst/>
+                <a:latin typeface="Arial" panose="020B0604020202020204" pitchFamily="34" charset="0"/>
+              </a:rPr>
+              <a:t>une liste à l'intérieur de votre liste</a:t>
+            </a:r>
+            <a:r>
+              <a:rPr kumimoji="0" lang="fr-FR" altLang="fr-FR" sz="1200" b="0" i="0" u="none" strike="noStrike" cap="none" normalizeH="0" baseline="0" dirty="0">
+                <a:ln>
+                  <a:noFill/>
+                </a:ln>
+                <a:solidFill>
+                  <a:schemeClr val="tx1"/>
+                </a:solidFill>
+                <a:effectLst/>
+                <a:latin typeface="Arial" panose="020B0604020202020204" pitchFamily="34" charset="0"/>
+              </a:rPr>
+              <a:t>.</a:t>
+            </a:r>
+          </a:p>
+          <a:p>
+            <a:pPr marL="0" marR="0" lvl="0" indent="0" algn="l" defTabSz="914400" rtl="0" eaLnBrk="0" fontAlgn="base" latinLnBrk="0" hangingPunct="0">
+              <a:lnSpc>
+                <a:spcPct val="100000"/>
+              </a:lnSpc>
+              <a:spcBef>
+                <a:spcPct val="0"/>
+              </a:spcBef>
+              <a:spcAft>
+                <a:spcPct val="0"/>
+              </a:spcAft>
+              <a:buClrTx/>
+              <a:buSzTx/>
+              <a:buFontTx/>
+              <a:buNone/>
+              <a:tabLst/>
+            </a:pPr>
+            <a:r>
+              <a:rPr kumimoji="0" lang="fr-FR" altLang="fr-FR" sz="1200" b="0" i="0" u="none" strike="noStrike" cap="none" normalizeH="0" baseline="0" dirty="0">
+                <a:ln>
+                  <a:noFill/>
+                </a:ln>
+                <a:solidFill>
+                  <a:schemeClr val="tx1"/>
+                </a:solidFill>
+                <a:effectLst/>
+                <a:latin typeface="Arial" panose="020B0604020202020204" pitchFamily="34" charset="0"/>
+              </a:rPr>
+              <a:t>Pour ajouter plusieurs éléments d'un coup sans créer une sous-liste, il faut donc utiliser la fonction </a:t>
+            </a:r>
+            <a:r>
+              <a:rPr kumimoji="0" lang="fr-FR" altLang="fr-FR" sz="1200" b="0" i="0" u="none" strike="noStrike" cap="none" normalizeH="0" baseline="0" dirty="0" err="1">
+                <a:ln>
+                  <a:noFill/>
+                </a:ln>
+                <a:solidFill>
+                  <a:schemeClr val="tx1"/>
+                </a:solidFill>
+                <a:effectLst/>
+                <a:latin typeface="Arial" panose="020B0604020202020204" pitchFamily="34" charset="0"/>
+              </a:rPr>
+              <a:t>extend</a:t>
+            </a:r>
+            <a:r>
+              <a:rPr kumimoji="0" lang="fr-FR" altLang="fr-FR" sz="1200" b="0" i="0" u="none" strike="noStrike" cap="none" normalizeH="0" baseline="0" dirty="0">
+                <a:ln>
+                  <a:noFill/>
+                </a:ln>
+                <a:solidFill>
+                  <a:schemeClr val="tx1"/>
+                </a:solidFill>
+                <a:effectLst/>
+                <a:latin typeface="Arial" panose="020B0604020202020204" pitchFamily="34" charset="0"/>
+              </a:rPr>
+              <a:t>, qui va ajouter à la fin de votre liste les différents éléments que vous lui passez.</a:t>
+            </a:r>
+          </a:p>
+          <a:p>
+            <a:pPr marL="0" marR="0" lvl="0" indent="0" algn="l" defTabSz="914400" rtl="0" eaLnBrk="0" fontAlgn="base" latinLnBrk="0" hangingPunct="0">
+              <a:lnSpc>
+                <a:spcPct val="100000"/>
+              </a:lnSpc>
+              <a:spcBef>
+                <a:spcPct val="0"/>
+              </a:spcBef>
+              <a:spcAft>
+                <a:spcPct val="0"/>
+              </a:spcAft>
+              <a:buClrTx/>
+              <a:buSzTx/>
+              <a:buFontTx/>
+              <a:buNone/>
+              <a:tabLst/>
+            </a:pPr>
+            <a:r>
+              <a:rPr kumimoji="0" lang="fr-FR" altLang="fr-FR" sz="1200" b="0" i="0" u="none" strike="noStrike" cap="none" normalizeH="0" baseline="0" dirty="0">
+                <a:ln>
+                  <a:noFill/>
+                </a:ln>
+                <a:solidFill>
+                  <a:schemeClr val="tx1"/>
+                </a:solidFill>
+                <a:effectLst/>
+                <a:latin typeface="Arial" panose="020B0604020202020204" pitchFamily="34" charset="0"/>
+              </a:rPr>
+              <a:t>Il peut y avoir de la confusion dans le fait que vous devez passer une liste à la fonction </a:t>
+            </a:r>
+            <a:r>
+              <a:rPr kumimoji="0" lang="fr-FR" altLang="fr-FR" sz="1200" b="0" i="0" u="none" strike="noStrike" cap="none" normalizeH="0" baseline="0" dirty="0" err="1">
+                <a:ln>
+                  <a:noFill/>
+                </a:ln>
+                <a:solidFill>
+                  <a:schemeClr val="tx1"/>
+                </a:solidFill>
+                <a:effectLst/>
+                <a:latin typeface="Arial" panose="020B0604020202020204" pitchFamily="34" charset="0"/>
+              </a:rPr>
+              <a:t>extend</a:t>
+            </a:r>
+            <a:r>
+              <a:rPr kumimoji="0" lang="fr-FR" altLang="fr-FR" sz="1200" b="0" i="0" u="none" strike="noStrike" cap="none" normalizeH="0" baseline="0" dirty="0">
+                <a:ln>
+                  <a:noFill/>
+                </a:ln>
+                <a:solidFill>
+                  <a:schemeClr val="tx1"/>
+                </a:solidFill>
+                <a:effectLst/>
+                <a:latin typeface="Arial" panose="020B0604020202020204" pitchFamily="34" charset="0"/>
+              </a:rPr>
+              <a:t>.</a:t>
+            </a:r>
+          </a:p>
+          <a:p>
+            <a:pPr marL="0" marR="0" lvl="0" indent="0" algn="l" defTabSz="914400" rtl="0" eaLnBrk="0" fontAlgn="base" latinLnBrk="0" hangingPunct="0">
+              <a:lnSpc>
+                <a:spcPct val="100000"/>
+              </a:lnSpc>
+              <a:spcBef>
+                <a:spcPct val="0"/>
+              </a:spcBef>
+              <a:spcAft>
+                <a:spcPct val="0"/>
+              </a:spcAft>
+              <a:buClrTx/>
+              <a:buSzTx/>
+              <a:buFontTx/>
+              <a:buNone/>
+              <a:tabLst/>
+            </a:pPr>
+            <a:r>
+              <a:rPr kumimoji="0" lang="fr-FR" altLang="fr-FR" sz="1200" b="0" i="0" u="none" strike="noStrike" cap="none" normalizeH="0" baseline="0" dirty="0">
+                <a:ln>
+                  <a:noFill/>
+                </a:ln>
+                <a:solidFill>
+                  <a:schemeClr val="tx1"/>
+                </a:solidFill>
+                <a:effectLst/>
+                <a:latin typeface="Arial" panose="020B0604020202020204" pitchFamily="34" charset="0"/>
+              </a:rPr>
+              <a:t>Ainsi vous ne pouvez pas faire :</a:t>
+            </a:r>
+          </a:p>
+          <a:p>
+            <a:pPr marL="0" marR="0" lvl="0" indent="0" algn="l" defTabSz="914400" rtl="0" eaLnBrk="0" fontAlgn="base" latinLnBrk="0" hangingPunct="0">
+              <a:lnSpc>
+                <a:spcPct val="100000"/>
+              </a:lnSpc>
+              <a:spcBef>
+                <a:spcPct val="0"/>
+              </a:spcBef>
+              <a:spcAft>
+                <a:spcPct val="0"/>
+              </a:spcAft>
+              <a:buClrTx/>
+              <a:buSzTx/>
+              <a:buFontTx/>
+              <a:buNone/>
+              <a:tabLst/>
+            </a:pPr>
+            <a:r>
+              <a:rPr kumimoji="0" lang="fr-FR" altLang="fr-FR" sz="1000" b="0" i="0" u="none" strike="noStrike" cap="none" normalizeH="0" baseline="0" dirty="0" err="1">
+                <a:ln>
+                  <a:noFill/>
+                </a:ln>
+                <a:solidFill>
+                  <a:schemeClr val="tx1"/>
+                </a:solidFill>
+                <a:effectLst/>
+                <a:latin typeface="Arial Unicode MS"/>
+              </a:rPr>
+              <a:t>ma_liste.extend</a:t>
+            </a:r>
+            <a:r>
+              <a:rPr kumimoji="0" lang="fr-FR" altLang="fr-FR" sz="1000" b="0" i="0" u="none" strike="noStrike" cap="none" normalizeH="0" baseline="0" dirty="0">
+                <a:ln>
+                  <a:noFill/>
+                </a:ln>
+                <a:solidFill>
+                  <a:schemeClr val="tx1"/>
+                </a:solidFill>
+                <a:effectLst/>
+                <a:latin typeface="Arial Unicode MS"/>
+              </a:rPr>
+              <a:t>(4, 5, 6)</a:t>
+            </a:r>
+            <a:r>
+              <a:rPr kumimoji="0" lang="fr-FR" altLang="fr-FR" sz="600" b="0" i="0" u="none" strike="noStrike" cap="none" normalizeH="0" baseline="0" dirty="0">
+                <a:ln>
+                  <a:noFill/>
+                </a:ln>
+                <a:solidFill>
+                  <a:schemeClr val="tx1"/>
+                </a:solidFill>
+                <a:effectLst/>
+              </a:rPr>
+              <a:t> </a:t>
+            </a:r>
+            <a:endParaRPr kumimoji="0" lang="fr-FR" altLang="fr-FR" sz="1800" b="0" i="0" u="none" strike="noStrike" cap="none" normalizeH="0" baseline="0" dirty="0">
+              <a:ln>
+                <a:noFill/>
+              </a:ln>
+              <a:solidFill>
+                <a:schemeClr val="tx1"/>
+              </a:solidFill>
+              <a:effectLst/>
+              <a:latin typeface="Arial" panose="020B0604020202020204" pitchFamily="34" charset="0"/>
+            </a:endParaRPr>
+          </a:p>
+          <a:p>
+            <a:pPr marL="0" marR="0" lvl="0" indent="0" algn="l" defTabSz="914400" rtl="0" eaLnBrk="0" fontAlgn="base" latinLnBrk="0" hangingPunct="0">
+              <a:lnSpc>
+                <a:spcPct val="100000"/>
+              </a:lnSpc>
+              <a:spcBef>
+                <a:spcPct val="0"/>
+              </a:spcBef>
+              <a:spcAft>
+                <a:spcPct val="0"/>
+              </a:spcAft>
+              <a:buClrTx/>
+              <a:buSzTx/>
+              <a:buFontTx/>
+              <a:buNone/>
+              <a:tabLst/>
+            </a:pPr>
+            <a:r>
+              <a:rPr kumimoji="0" lang="fr-FR" altLang="fr-FR" sz="1200" b="0" i="0" u="none" strike="noStrike" cap="none" normalizeH="0" baseline="0" dirty="0">
+                <a:ln>
+                  <a:noFill/>
+                </a:ln>
+                <a:solidFill>
+                  <a:schemeClr val="tx1"/>
+                </a:solidFill>
+                <a:effectLst/>
+                <a:latin typeface="Arial" panose="020B0604020202020204" pitchFamily="34" charset="0"/>
+              </a:rPr>
+              <a:t>Il faut à la place faire :</a:t>
+            </a:r>
+          </a:p>
+          <a:p>
+            <a:pPr marL="0" marR="0" lvl="0" indent="0" algn="l" defTabSz="914400" rtl="0" eaLnBrk="0" fontAlgn="base" latinLnBrk="0" hangingPunct="0">
+              <a:lnSpc>
+                <a:spcPct val="100000"/>
+              </a:lnSpc>
+              <a:spcBef>
+                <a:spcPct val="0"/>
+              </a:spcBef>
+              <a:spcAft>
+                <a:spcPct val="0"/>
+              </a:spcAft>
+              <a:buClrTx/>
+              <a:buSzTx/>
+              <a:buFontTx/>
+              <a:buNone/>
+              <a:tabLst/>
+            </a:pPr>
+            <a:r>
+              <a:rPr kumimoji="0" lang="fr-FR" altLang="fr-FR" sz="1000" b="0" i="0" u="none" strike="noStrike" cap="none" normalizeH="0" baseline="0" dirty="0" err="1">
+                <a:ln>
+                  <a:noFill/>
+                </a:ln>
+                <a:solidFill>
+                  <a:schemeClr val="tx1"/>
+                </a:solidFill>
+                <a:effectLst/>
+                <a:latin typeface="Arial Unicode MS"/>
+              </a:rPr>
+              <a:t>ma_liste.extend</a:t>
+            </a:r>
+            <a:r>
+              <a:rPr kumimoji="0" lang="fr-FR" altLang="fr-FR" sz="1000" b="0" i="0" u="none" strike="noStrike" cap="none" normalizeH="0" baseline="0" dirty="0">
+                <a:ln>
+                  <a:noFill/>
+                </a:ln>
+                <a:solidFill>
+                  <a:schemeClr val="tx1"/>
+                </a:solidFill>
+                <a:effectLst/>
+                <a:latin typeface="Arial Unicode MS"/>
+              </a:rPr>
+              <a:t>([4, 5, 6])</a:t>
+            </a:r>
+            <a:r>
+              <a:rPr kumimoji="0" lang="fr-FR" altLang="fr-FR" sz="600" b="0" i="0" u="none" strike="noStrike" cap="none" normalizeH="0" baseline="0" dirty="0">
+                <a:ln>
+                  <a:noFill/>
+                </a:ln>
+                <a:solidFill>
+                  <a:schemeClr val="tx1"/>
+                </a:solidFill>
+                <a:effectLst/>
+              </a:rPr>
+              <a:t> </a:t>
+            </a:r>
+            <a:endParaRPr kumimoji="0" lang="fr-FR" altLang="fr-FR" sz="1800" b="0" i="0" u="none" strike="noStrike" cap="none" normalizeH="0" baseline="0" dirty="0">
+              <a:ln>
+                <a:noFill/>
+              </a:ln>
+              <a:solidFill>
+                <a:schemeClr val="tx1"/>
+              </a:solidFill>
+              <a:effectLst/>
+              <a:latin typeface="Arial" panose="020B0604020202020204" pitchFamily="34" charset="0"/>
+            </a:endParaRPr>
+          </a:p>
+          <a:p>
+            <a:pPr marL="0" marR="0" lvl="0" indent="0" algn="l" defTabSz="914400" rtl="0" eaLnBrk="0" fontAlgn="base" latinLnBrk="0" hangingPunct="0">
+              <a:lnSpc>
+                <a:spcPct val="100000"/>
+              </a:lnSpc>
+              <a:spcBef>
+                <a:spcPct val="0"/>
+              </a:spcBef>
+              <a:spcAft>
+                <a:spcPct val="0"/>
+              </a:spcAft>
+              <a:buClrTx/>
+              <a:buSzTx/>
+              <a:buFontTx/>
+              <a:buNone/>
+              <a:tabLst/>
+            </a:pPr>
+            <a:r>
+              <a:rPr kumimoji="0" lang="fr-FR" altLang="fr-FR" sz="1200" b="0" i="0" u="none" strike="noStrike" cap="none" normalizeH="0" baseline="0" dirty="0">
+                <a:ln>
+                  <a:noFill/>
+                </a:ln>
+                <a:solidFill>
+                  <a:schemeClr val="tx1"/>
+                </a:solidFill>
+                <a:effectLst/>
+                <a:latin typeface="Arial" panose="020B0604020202020204" pitchFamily="34" charset="0"/>
+              </a:rPr>
+              <a:t>Bien que l'on passe une liste en argument de la fonction </a:t>
+            </a:r>
+            <a:r>
+              <a:rPr kumimoji="0" lang="fr-FR" altLang="fr-FR" sz="1200" b="0" i="0" u="none" strike="noStrike" cap="none" normalizeH="0" baseline="0" dirty="0" err="1">
+                <a:ln>
+                  <a:noFill/>
+                </a:ln>
+                <a:solidFill>
+                  <a:schemeClr val="tx1"/>
+                </a:solidFill>
+                <a:effectLst/>
+                <a:latin typeface="Arial" panose="020B0604020202020204" pitchFamily="34" charset="0"/>
+              </a:rPr>
+              <a:t>extend</a:t>
+            </a:r>
+            <a:r>
+              <a:rPr kumimoji="0" lang="fr-FR" altLang="fr-FR" sz="1200" b="0" i="0" u="none" strike="noStrike" cap="none" normalizeH="0" baseline="0" dirty="0">
+                <a:ln>
+                  <a:noFill/>
+                </a:ln>
+                <a:solidFill>
+                  <a:schemeClr val="tx1"/>
+                </a:solidFill>
+                <a:effectLst/>
+                <a:latin typeface="Arial" panose="020B0604020202020204" pitchFamily="34" charset="0"/>
+              </a:rPr>
+              <a:t>, cette fonction va bien ajouter les éléments à l'intérieur de votre liste</a:t>
+            </a:r>
+            <a:r>
+              <a:rPr kumimoji="0" lang="fr-FR" altLang="fr-FR" sz="1200" b="1" i="0" u="none" strike="noStrike" cap="none" normalizeH="0" baseline="0" dirty="0">
+                <a:ln>
+                  <a:noFill/>
+                </a:ln>
+                <a:solidFill>
+                  <a:schemeClr val="tx1"/>
+                </a:solidFill>
+                <a:effectLst/>
+                <a:latin typeface="Arial" panose="020B0604020202020204" pitchFamily="34" charset="0"/>
+              </a:rPr>
+              <a:t> sans créer de sous-liste</a:t>
+            </a:r>
+            <a:r>
+              <a:rPr kumimoji="0" lang="fr-FR" altLang="fr-FR" sz="1200" b="0" i="0" u="none" strike="noStrike" cap="none" normalizeH="0" baseline="0" dirty="0">
+                <a:ln>
+                  <a:noFill/>
+                </a:ln>
+                <a:solidFill>
+                  <a:schemeClr val="tx1"/>
+                </a:solidFill>
+                <a:effectLst/>
+                <a:latin typeface="Arial" panose="020B0604020202020204" pitchFamily="34" charset="0"/>
+              </a:rPr>
+              <a:t>.</a:t>
+            </a:r>
+          </a:p>
+          <a:p>
+            <a:pPr marL="0" marR="0" lvl="0" indent="0" eaLnBrk="0" fontAlgn="base" hangingPunct="0">
+              <a:lnSpc>
+                <a:spcPct val="100000"/>
+              </a:lnSpc>
+              <a:spcBef>
+                <a:spcPct val="0"/>
+              </a:spcBef>
+              <a:spcAft>
+                <a:spcPct val="0"/>
+              </a:spcAft>
+              <a:buClrTx/>
+              <a:buSzTx/>
+              <a:buFontTx/>
+              <a:buChar char="•"/>
+              <a:tabLst/>
+            </a:pPr>
+            <a:endParaRPr lang="fr-FR" altLang="fr-FR" sz="1800" b="1" dirty="0">
+              <a:latin typeface="Arial" panose="020B0604020202020204" pitchFamily="34" charset="0"/>
+            </a:endParaRPr>
+          </a:p>
+          <a:p>
+            <a:pPr marL="0" marR="0" lvl="0" indent="0" eaLnBrk="0" fontAlgn="base" hangingPunct="0">
+              <a:lnSpc>
+                <a:spcPct val="100000"/>
+              </a:lnSpc>
+              <a:spcBef>
+                <a:spcPct val="0"/>
+              </a:spcBef>
+              <a:spcAft>
+                <a:spcPct val="0"/>
+              </a:spcAft>
+              <a:buClrTx/>
+              <a:buSzTx/>
+              <a:buFontTx/>
+              <a:buChar char="•"/>
+              <a:tabLst/>
+            </a:pPr>
+            <a:r>
+              <a:rPr lang="fr-FR" altLang="fr-FR" sz="1800" b="1" dirty="0">
+                <a:latin typeface="Arial" panose="020B0604020202020204" pitchFamily="34" charset="0"/>
+              </a:rPr>
+              <a:t>POINTS IMPORTANTS À RETENIR</a:t>
+            </a:r>
+          </a:p>
+          <a:p>
+            <a:pPr marL="0" marR="0" lvl="0" indent="0" algn="l" defTabSz="914400" rtl="0" eaLnBrk="0" fontAlgn="base" latinLnBrk="0" hangingPunct="0">
+              <a:lnSpc>
+                <a:spcPct val="100000"/>
+              </a:lnSpc>
+              <a:spcBef>
+                <a:spcPct val="0"/>
+              </a:spcBef>
+              <a:spcAft>
+                <a:spcPct val="0"/>
+              </a:spcAft>
+              <a:buClrTx/>
+              <a:buSzTx/>
+              <a:buNone/>
+              <a:tabLst/>
+            </a:pPr>
+            <a:r>
+              <a:rPr kumimoji="0" lang="fr-FR" altLang="fr-FR" sz="1200" b="0" i="0" u="none" strike="noStrike" cap="none" normalizeH="0" baseline="0" dirty="0">
+                <a:ln>
+                  <a:noFill/>
+                </a:ln>
+                <a:solidFill>
+                  <a:schemeClr val="tx1"/>
+                </a:solidFill>
+                <a:effectLst/>
+                <a:latin typeface="Arial" panose="020B0604020202020204" pitchFamily="34" charset="0"/>
+              </a:rPr>
+              <a:t>Pour ajouter plusieurs éléments dans une liste en une seule fois, on utilise la fonction </a:t>
+            </a:r>
+            <a:r>
+              <a:rPr kumimoji="0" lang="fr-FR" altLang="fr-FR" sz="1200" b="0" i="0" u="none" strike="noStrike" cap="none" normalizeH="0" baseline="0" dirty="0" err="1">
+                <a:ln>
+                  <a:noFill/>
+                </a:ln>
+                <a:solidFill>
+                  <a:schemeClr val="tx1"/>
+                </a:solidFill>
+                <a:effectLst/>
+                <a:latin typeface="Arial" panose="020B0604020202020204" pitchFamily="34" charset="0"/>
+              </a:rPr>
+              <a:t>extend</a:t>
+            </a:r>
+            <a:r>
+              <a:rPr kumimoji="0" lang="fr-FR" altLang="fr-FR" sz="1200" b="0" i="0" u="none" strike="noStrike" cap="none" normalizeH="0" baseline="0" dirty="0">
+                <a:ln>
+                  <a:noFill/>
+                </a:ln>
+                <a:solidFill>
+                  <a:schemeClr val="tx1"/>
+                </a:solidFill>
+                <a:effectLst/>
+                <a:latin typeface="Arial" panose="020B0604020202020204" pitchFamily="34" charset="0"/>
+              </a:rPr>
+              <a:t>.</a:t>
+            </a:r>
+          </a:p>
+          <a:p>
+            <a:pPr marL="0" marR="0" lvl="0" indent="0" algn="l" defTabSz="914400" rtl="0" eaLnBrk="0" fontAlgn="base" latinLnBrk="0" hangingPunct="0">
+              <a:lnSpc>
+                <a:spcPct val="100000"/>
+              </a:lnSpc>
+              <a:spcBef>
+                <a:spcPct val="0"/>
+              </a:spcBef>
+              <a:spcAft>
+                <a:spcPct val="0"/>
+              </a:spcAft>
+              <a:buClrTx/>
+              <a:buSzTx/>
+              <a:buFontTx/>
+              <a:buNone/>
+              <a:tabLst/>
+            </a:pPr>
+            <a:endParaRPr kumimoji="0" lang="fr-FR" altLang="fr-FR" sz="1800" b="0" i="0" u="none" strike="noStrike" cap="none" normalizeH="0" baseline="0" dirty="0">
+              <a:ln>
+                <a:noFill/>
+              </a:ln>
+              <a:solidFill>
+                <a:schemeClr val="tx1"/>
+              </a:solidFill>
+              <a:effectLst/>
+              <a:latin typeface="Arial" panose="020B0604020202020204" pitchFamily="34" charset="0"/>
+            </a:endParaRPr>
+          </a:p>
+        </p:txBody>
+      </p:sp>
+    </p:spTree>
+    <p:extLst>
+      <p:ext uri="{BB962C8B-B14F-4D97-AF65-F5344CB8AC3E}">
+        <p14:creationId xmlns:p14="http://schemas.microsoft.com/office/powerpoint/2010/main" val="2681806726"/>
+      </p:ext>
+    </p:extLst>
+  </p:cSld>
+  <p:clrMapOvr>
+    <a:masterClrMapping/>
+  </p:clrMapOvr>
+</p:sld>
+</file>
+
+<file path=ppt/slides/slide66.xml><?xml version="1.0" encoding="utf-8"?>
+<p:sld xmlns:a="http://schemas.openxmlformats.org/drawingml/2006/main" xmlns:r="http://schemas.openxmlformats.org/officeDocument/2006/relationships" xmlns:p="http://schemas.openxmlformats.org/presentationml/2006/main">
+  <p:cSld>
+    <p:spTree>
+      <p:nvGrpSpPr>
+        <p:cNvPr id="1" name=""/>
+        <p:cNvGrpSpPr/>
+        <p:nvPr/>
+      </p:nvGrpSpPr>
+      <p:grpSpPr>
+        <a:xfrm>
+          <a:off x="0" y="0"/>
+          <a:ext cx="0" cy="0"/>
+          <a:chOff x="0" y="0"/>
+          <a:chExt cx="0" cy="0"/>
+        </a:xfrm>
+      </p:grpSpPr>
       <p:pic>
         <p:nvPicPr>
           <p:cNvPr id="1026" name="Picture 2" descr="Related image"/>

</xml_diff>